<commit_message>
Added flow diagrams of the simulators.
</commit_message>
<xml_diff>
--- a/Prac2/Part 2/Presentation.pptx
+++ b/Prac2/Part 2/Presentation.pptx
@@ -8,12 +8,14 @@
     <p:sldId id="256" r:id="rId2"/>
     <p:sldId id="257" r:id="rId3"/>
     <p:sldId id="258" r:id="rId4"/>
-    <p:sldId id="260" r:id="rId5"/>
-    <p:sldId id="261" r:id="rId6"/>
-    <p:sldId id="265" r:id="rId7"/>
-    <p:sldId id="262" r:id="rId8"/>
-    <p:sldId id="263" r:id="rId9"/>
-    <p:sldId id="264" r:id="rId10"/>
+    <p:sldId id="266" r:id="rId5"/>
+    <p:sldId id="260" r:id="rId6"/>
+    <p:sldId id="261" r:id="rId7"/>
+    <p:sldId id="265" r:id="rId8"/>
+    <p:sldId id="262" r:id="rId9"/>
+    <p:sldId id="267" r:id="rId10"/>
+    <p:sldId id="263" r:id="rId11"/>
+    <p:sldId id="264" r:id="rId12"/>
   </p:sldIdLst>
   <p:sldSz cx="12192000" cy="6858000"/>
   <p:notesSz cx="6858000" cy="9144000"/>
@@ -308,7 +310,7 @@
           <a:p>
             <a:fld id="{F1A8E312-5357-423D-9805-2C398908D092}" type="datetimeFigureOut">
               <a:rPr lang="en-ZA" smtClean="0"/>
-              <a:t>2019/09/16</a:t>
+              <a:t>2019/09/17</a:t>
             </a:fld>
             <a:endParaRPr lang="en-ZA"/>
           </a:p>
@@ -646,7 +648,7 @@
           <a:p>
             <a:fld id="{F1A8E312-5357-423D-9805-2C398908D092}" type="datetimeFigureOut">
               <a:rPr lang="en-ZA" smtClean="0"/>
-              <a:t>2019/09/16</a:t>
+              <a:t>2019/09/17</a:t>
             </a:fld>
             <a:endParaRPr lang="en-ZA"/>
           </a:p>
@@ -1047,7 +1049,7 @@
           <a:p>
             <a:fld id="{F1A8E312-5357-423D-9805-2C398908D092}" type="datetimeFigureOut">
               <a:rPr lang="en-ZA" smtClean="0"/>
-              <a:t>2019/09/16</a:t>
+              <a:t>2019/09/17</a:t>
             </a:fld>
             <a:endParaRPr lang="en-ZA"/>
           </a:p>
@@ -1383,7 +1385,7 @@
           <a:p>
             <a:fld id="{F1A8E312-5357-423D-9805-2C398908D092}" type="datetimeFigureOut">
               <a:rPr lang="en-ZA" smtClean="0"/>
-              <a:t>2019/09/16</a:t>
+              <a:t>2019/09/17</a:t>
             </a:fld>
             <a:endParaRPr lang="en-ZA"/>
           </a:p>
@@ -1703,7 +1705,7 @@
           <a:p>
             <a:fld id="{F1A8E312-5357-423D-9805-2C398908D092}" type="datetimeFigureOut">
               <a:rPr lang="en-ZA" smtClean="0"/>
-              <a:t>2019/09/16</a:t>
+              <a:t>2019/09/17</a:t>
             </a:fld>
             <a:endParaRPr lang="en-ZA"/>
           </a:p>
@@ -2099,7 +2101,7 @@
           <a:p>
             <a:fld id="{F1A8E312-5357-423D-9805-2C398908D092}" type="datetimeFigureOut">
               <a:rPr lang="en-ZA" smtClean="0"/>
-              <a:t>2019/09/16</a:t>
+              <a:t>2019/09/17</a:t>
             </a:fld>
             <a:endParaRPr lang="en-ZA"/>
           </a:p>
@@ -2356,7 +2358,7 @@
           <a:p>
             <a:fld id="{F1A8E312-5357-423D-9805-2C398908D092}" type="datetimeFigureOut">
               <a:rPr lang="en-ZA" smtClean="0"/>
-              <a:t>2019/09/16</a:t>
+              <a:t>2019/09/17</a:t>
             </a:fld>
             <a:endParaRPr lang="en-ZA"/>
           </a:p>
@@ -2618,7 +2620,7 @@
           <a:p>
             <a:fld id="{F1A8E312-5357-423D-9805-2C398908D092}" type="datetimeFigureOut">
               <a:rPr lang="en-ZA" smtClean="0"/>
-              <a:t>2019/09/16</a:t>
+              <a:t>2019/09/17</a:t>
             </a:fld>
             <a:endParaRPr lang="en-ZA"/>
           </a:p>
@@ -2880,7 +2882,7 @@
           <a:p>
             <a:fld id="{F1A8E312-5357-423D-9805-2C398908D092}" type="datetimeFigureOut">
               <a:rPr lang="en-ZA" smtClean="0"/>
-              <a:t>2019/09/16</a:t>
+              <a:t>2019/09/17</a:t>
             </a:fld>
             <a:endParaRPr lang="en-ZA"/>
           </a:p>
@@ -3209,7 +3211,7 @@
           <a:p>
             <a:fld id="{F1A8E312-5357-423D-9805-2C398908D092}" type="datetimeFigureOut">
               <a:rPr lang="en-ZA" smtClean="0"/>
-              <a:t>2019/09/16</a:t>
+              <a:t>2019/09/17</a:t>
             </a:fld>
             <a:endParaRPr lang="en-ZA"/>
           </a:p>
@@ -3532,7 +3534,7 @@
           <a:p>
             <a:fld id="{F1A8E312-5357-423D-9805-2C398908D092}" type="datetimeFigureOut">
               <a:rPr lang="en-ZA" smtClean="0"/>
-              <a:t>2019/09/16</a:t>
+              <a:t>2019/09/17</a:t>
             </a:fld>
             <a:endParaRPr lang="en-ZA"/>
           </a:p>
@@ -3989,7 +3991,7 @@
           <a:p>
             <a:fld id="{F1A8E312-5357-423D-9805-2C398908D092}" type="datetimeFigureOut">
               <a:rPr lang="en-ZA" smtClean="0"/>
-              <a:t>2019/09/16</a:t>
+              <a:t>2019/09/17</a:t>
             </a:fld>
             <a:endParaRPr lang="en-ZA"/>
           </a:p>
@@ -4194,7 +4196,7 @@
           <a:p>
             <a:fld id="{F1A8E312-5357-423D-9805-2C398908D092}" type="datetimeFigureOut">
               <a:rPr lang="en-ZA" smtClean="0"/>
-              <a:t>2019/09/16</a:t>
+              <a:t>2019/09/17</a:t>
             </a:fld>
             <a:endParaRPr lang="en-ZA"/>
           </a:p>
@@ -4371,7 +4373,7 @@
           <a:p>
             <a:fld id="{F1A8E312-5357-423D-9805-2C398908D092}" type="datetimeFigureOut">
               <a:rPr lang="en-ZA" smtClean="0"/>
-              <a:t>2019/09/16</a:t>
+              <a:t>2019/09/17</a:t>
             </a:fld>
             <a:endParaRPr lang="en-ZA"/>
           </a:p>
@@ -4704,7 +4706,7 @@
           <a:p>
             <a:fld id="{F1A8E312-5357-423D-9805-2C398908D092}" type="datetimeFigureOut">
               <a:rPr lang="en-ZA" smtClean="0"/>
-              <a:t>2019/09/16</a:t>
+              <a:t>2019/09/17</a:t>
             </a:fld>
             <a:endParaRPr lang="en-ZA"/>
           </a:p>
@@ -5049,7 +5051,7 @@
           <a:p>
             <a:fld id="{F1A8E312-5357-423D-9805-2C398908D092}" type="datetimeFigureOut">
               <a:rPr lang="en-ZA" smtClean="0"/>
-              <a:t>2019/09/16</a:t>
+              <a:t>2019/09/17</a:t>
             </a:fld>
             <a:endParaRPr lang="en-ZA"/>
           </a:p>
@@ -7166,7 +7168,7 @@
           <a:p>
             <a:fld id="{F1A8E312-5357-423D-9805-2C398908D092}" type="datetimeFigureOut">
               <a:rPr lang="en-ZA" smtClean="0"/>
-              <a:t>2019/09/16</a:t>
+              <a:t>2019/09/17</a:t>
             </a:fld>
             <a:endParaRPr lang="en-ZA"/>
           </a:p>
@@ -7771,6 +7773,164 @@
 </p:sld>
 </file>
 
+<file path=ppt/slides/slide10.xml><?xml version="1.0" encoding="utf-8"?>
+<p:sld xmlns:a="http://schemas.openxmlformats.org/drawingml/2006/main" xmlns:r="http://schemas.openxmlformats.org/officeDocument/2006/relationships" xmlns:p="http://schemas.openxmlformats.org/presentationml/2006/main">
+  <p:cSld>
+    <p:spTree>
+      <p:nvGrpSpPr>
+        <p:cNvPr id="1" name=""/>
+        <p:cNvGrpSpPr/>
+        <p:nvPr/>
+      </p:nvGrpSpPr>
+      <p:grpSpPr>
+        <a:xfrm>
+          <a:off x="0" y="0"/>
+          <a:ext cx="0" cy="0"/>
+          <a:chOff x="0" y="0"/>
+          <a:chExt cx="0" cy="0"/>
+        </a:xfrm>
+      </p:grpSpPr>
+      <p:sp>
+        <p:nvSpPr>
+          <p:cNvPr id="2" name="Title 1"/>
+          <p:cNvSpPr>
+            <a:spLocks noGrp="1"/>
+          </p:cNvSpPr>
+          <p:nvPr>
+            <p:ph type="title"/>
+          </p:nvPr>
+        </p:nvSpPr>
+        <p:spPr/>
+        <p:txBody>
+          <a:bodyPr/>
+          <a:lstStyle/>
+          <a:p>
+            <a:r>
+              <a:rPr lang="en-ZA" dirty="0" smtClean="0"/>
+              <a:t>Quality of Service</a:t>
+            </a:r>
+            <a:endParaRPr lang="en-ZA" dirty="0"/>
+          </a:p>
+        </p:txBody>
+      </p:sp>
+      <p:sp>
+        <p:nvSpPr>
+          <p:cNvPr id="3" name="Content Placeholder 2"/>
+          <p:cNvSpPr>
+            <a:spLocks noGrp="1"/>
+          </p:cNvSpPr>
+          <p:nvPr>
+            <p:ph idx="1"/>
+          </p:nvPr>
+        </p:nvSpPr>
+        <p:spPr/>
+        <p:txBody>
+          <a:bodyPr/>
+          <a:lstStyle/>
+          <a:p>
+            <a:endParaRPr lang="en-ZA" dirty="0"/>
+          </a:p>
+        </p:txBody>
+      </p:sp>
+    </p:spTree>
+    <p:extLst>
+      <p:ext uri="{BB962C8B-B14F-4D97-AF65-F5344CB8AC3E}">
+        <p14:creationId xmlns:p14="http://schemas.microsoft.com/office/powerpoint/2010/main" val="4154402910"/>
+      </p:ext>
+    </p:extLst>
+  </p:cSld>
+  <p:clrMapOvr>
+    <a:masterClrMapping/>
+  </p:clrMapOvr>
+  <p:timing>
+    <p:tnLst>
+      <p:par>
+        <p:cTn id="1" dur="indefinite" restart="never" nodeType="tmRoot"/>
+      </p:par>
+    </p:tnLst>
+  </p:timing>
+</p:sld>
+</file>
+
+<file path=ppt/slides/slide11.xml><?xml version="1.0" encoding="utf-8"?>
+<p:sld xmlns:a="http://schemas.openxmlformats.org/drawingml/2006/main" xmlns:r="http://schemas.openxmlformats.org/officeDocument/2006/relationships" xmlns:p="http://schemas.openxmlformats.org/presentationml/2006/main">
+  <p:cSld>
+    <p:spTree>
+      <p:nvGrpSpPr>
+        <p:cNvPr id="1" name=""/>
+        <p:cNvGrpSpPr/>
+        <p:nvPr/>
+      </p:nvGrpSpPr>
+      <p:grpSpPr>
+        <a:xfrm>
+          <a:off x="0" y="0"/>
+          <a:ext cx="0" cy="0"/>
+          <a:chOff x="0" y="0"/>
+          <a:chExt cx="0" cy="0"/>
+        </a:xfrm>
+      </p:grpSpPr>
+      <p:sp>
+        <p:nvSpPr>
+          <p:cNvPr id="2" name="Title 1"/>
+          <p:cNvSpPr>
+            <a:spLocks noGrp="1"/>
+          </p:cNvSpPr>
+          <p:nvPr>
+            <p:ph type="title"/>
+          </p:nvPr>
+        </p:nvSpPr>
+        <p:spPr/>
+        <p:txBody>
+          <a:bodyPr/>
+          <a:lstStyle/>
+          <a:p>
+            <a:r>
+              <a:rPr lang="en-ZA" dirty="0" smtClean="0"/>
+              <a:t>FPGA implementation</a:t>
+            </a:r>
+            <a:endParaRPr lang="en-ZA" dirty="0"/>
+          </a:p>
+        </p:txBody>
+      </p:sp>
+      <p:sp>
+        <p:nvSpPr>
+          <p:cNvPr id="3" name="Content Placeholder 2"/>
+          <p:cNvSpPr>
+            <a:spLocks noGrp="1"/>
+          </p:cNvSpPr>
+          <p:nvPr>
+            <p:ph idx="1"/>
+          </p:nvPr>
+        </p:nvSpPr>
+        <p:spPr/>
+        <p:txBody>
+          <a:bodyPr/>
+          <a:lstStyle/>
+          <a:p>
+            <a:endParaRPr lang="en-ZA"/>
+          </a:p>
+        </p:txBody>
+      </p:sp>
+    </p:spTree>
+    <p:extLst>
+      <p:ext uri="{BB962C8B-B14F-4D97-AF65-F5344CB8AC3E}">
+        <p14:creationId xmlns:p14="http://schemas.microsoft.com/office/powerpoint/2010/main" val="3843322359"/>
+      </p:ext>
+    </p:extLst>
+  </p:cSld>
+  <p:clrMapOvr>
+    <a:masterClrMapping/>
+  </p:clrMapOvr>
+  <p:timing>
+    <p:tnLst>
+      <p:par>
+        <p:cTn id="1" dur="indefinite" restart="never" nodeType="tmRoot"/>
+      </p:par>
+    </p:tnLst>
+  </p:timing>
+</p:sld>
+</file>
+
 <file path=ppt/slides/slide2.xml><?xml version="1.0" encoding="utf-8"?>
 <p:sld xmlns:a="http://schemas.openxmlformats.org/drawingml/2006/main" xmlns:r="http://schemas.openxmlformats.org/officeDocument/2006/relationships" xmlns:p="http://schemas.openxmlformats.org/presentationml/2006/main">
   <p:cSld>
@@ -7836,6 +7996,86 @@
           <a:bodyPr/>
           <a:lstStyle/>
           <a:p>
+            <a:r>
+              <a:rPr lang="en-ZA" dirty="0" smtClean="0"/>
+              <a:t>Banks in particular aim to provid</a:t>
+            </a:r>
+            <a:r>
+              <a:rPr lang="en-ZA" dirty="0" smtClean="0"/>
+              <a:t>e the best possible client satisfaction and attempts to improve the client experience in banking systems.</a:t>
+            </a:r>
+            <a:endParaRPr lang="en-ZA" dirty="0" smtClean="0"/>
+          </a:p>
+          <a:p>
+            <a:r>
+              <a:rPr lang="en-ZA" dirty="0" smtClean="0"/>
+              <a:t>Considering </a:t>
+            </a:r>
+            <a:r>
+              <a:rPr lang="en-ZA" dirty="0" smtClean="0"/>
+              <a:t>improving the overall banking system experience:</a:t>
+            </a:r>
+          </a:p>
+          <a:p>
+            <a:pPr lvl="1"/>
+            <a:r>
+              <a:rPr lang="en-ZA" dirty="0" smtClean="0"/>
+              <a:t>Client perspective</a:t>
+            </a:r>
+          </a:p>
+          <a:p>
+            <a:pPr lvl="2"/>
+            <a:r>
+              <a:rPr lang="en-ZA" dirty="0" smtClean="0"/>
+              <a:t>Shorter queues</a:t>
+            </a:r>
+          </a:p>
+          <a:p>
+            <a:pPr lvl="2"/>
+            <a:r>
+              <a:rPr lang="en-ZA" dirty="0" smtClean="0"/>
+              <a:t>Shorter waiting </a:t>
+            </a:r>
+            <a:r>
+              <a:rPr lang="en-ZA" dirty="0" smtClean="0"/>
+              <a:t>times</a:t>
+            </a:r>
+          </a:p>
+          <a:p>
+            <a:pPr lvl="2"/>
+            <a:r>
+              <a:rPr lang="en-ZA" dirty="0" smtClean="0"/>
+              <a:t>Shorter service times.</a:t>
+            </a:r>
+            <a:endParaRPr lang="en-ZA" dirty="0" smtClean="0"/>
+          </a:p>
+          <a:p>
+            <a:pPr lvl="2"/>
+            <a:endParaRPr lang="en-ZA" dirty="0"/>
+          </a:p>
+          <a:p>
+            <a:pPr lvl="1"/>
+            <a:r>
+              <a:rPr lang="en-ZA" dirty="0" smtClean="0"/>
+              <a:t>Banking owner perspective</a:t>
+            </a:r>
+          </a:p>
+          <a:p>
+            <a:pPr lvl="2"/>
+            <a:r>
+              <a:rPr lang="en-ZA" dirty="0" smtClean="0"/>
+              <a:t>Increase </a:t>
+            </a:r>
+            <a:r>
+              <a:rPr lang="en-ZA" dirty="0" smtClean="0"/>
+              <a:t>profit.</a:t>
+            </a:r>
+          </a:p>
+          <a:p>
+            <a:r>
+              <a:rPr lang="en-ZA" dirty="0" smtClean="0"/>
+              <a:t>How can the banking experience be improved by looking at various service strategies such as first-in, first-out (FIFO), shortest-job-first (SJF) and highest-priority-first (HPF)?</a:t>
+            </a:r>
             <a:endParaRPr lang="en-ZA" dirty="0"/>
           </a:p>
         </p:txBody>
@@ -7918,209 +8158,108 @@
         <p:spPr>
           <a:xfrm>
             <a:off x="2589212" y="1418253"/>
-            <a:ext cx="8915400" cy="4492969"/>
+            <a:ext cx="8915400" cy="5113176"/>
           </a:xfrm>
         </p:spPr>
         <p:txBody>
           <a:bodyPr>
-            <a:normAutofit fontScale="77500" lnSpcReduction="20000"/>
+            <a:normAutofit fontScale="92500" lnSpcReduction="20000"/>
           </a:bodyPr>
           <a:lstStyle/>
           <a:p>
             <a:r>
               <a:rPr lang="en-ZA" dirty="0" smtClean="0"/>
-              <a:t>Relates </a:t>
-            </a:r>
-            <a:r>
-              <a:rPr lang="en-ZA" dirty="0"/>
-              <a:t>to the proposal and design of </a:t>
-            </a:r>
+              <a:t>Customers are accepted into the bank between 08:30 and 16:30.</a:t>
+            </a:r>
+          </a:p>
+          <a:p>
             <a:r>
               <a:rPr lang="en-ZA" dirty="0" smtClean="0"/>
-              <a:t>the queuing </a:t>
-            </a:r>
-            <a:r>
-              <a:rPr lang="en-ZA" dirty="0"/>
-              <a:t>scenario</a:t>
-            </a:r>
+              <a:t>At the start of the day, no customer is in the system and customers are refused entrance to the bank after 16:30.</a:t>
+            </a:r>
+          </a:p>
+          <a:p>
             <a:r>
               <a:rPr lang="en-ZA" dirty="0" smtClean="0"/>
-              <a:t>.</a:t>
-            </a:r>
-          </a:p>
-          <a:p>
+              <a:t>Different services are provided</a:t>
+            </a:r>
+          </a:p>
+          <a:p>
+            <a:pPr lvl="1"/>
             <a:r>
               <a:rPr lang="en-ZA" dirty="0" smtClean="0"/>
-              <a:t>Characteristics affecting performance.</a:t>
-            </a:r>
-          </a:p>
-          <a:p>
+              <a:t>Deposits and withdrawals</a:t>
+            </a:r>
+          </a:p>
+          <a:p>
+            <a:pPr lvl="1"/>
             <a:r>
               <a:rPr lang="en-ZA" dirty="0" smtClean="0"/>
-              <a:t>Identify </a:t>
-            </a:r>
-            <a:r>
-              <a:rPr lang="en-ZA" dirty="0"/>
-              <a:t>and </a:t>
-            </a:r>
+              <a:t>Banking statements</a:t>
+            </a:r>
+          </a:p>
+          <a:p>
+            <a:pPr lvl="1"/>
             <a:r>
               <a:rPr lang="en-ZA" dirty="0" smtClean="0"/>
-              <a:t>model every aspect of the scenario</a:t>
-            </a:r>
-          </a:p>
-          <a:p>
+              <a:t>General banking services</a:t>
+            </a:r>
+          </a:p>
+          <a:p>
+            <a:pPr lvl="1"/>
             <a:r>
               <a:rPr lang="en-ZA" dirty="0" smtClean="0"/>
-              <a:t>What </a:t>
-            </a:r>
-            <a:r>
-              <a:rPr lang="en-ZA" dirty="0"/>
-              <a:t>details will help </a:t>
-            </a:r>
+              <a:t>Account opening</a:t>
+            </a:r>
+          </a:p>
+          <a:p>
+            <a:pPr lvl="1"/>
             <a:r>
               <a:rPr lang="en-ZA" dirty="0" smtClean="0"/>
-              <a:t>or promote </a:t>
-            </a:r>
-            <a:r>
-              <a:rPr lang="en-ZA" dirty="0"/>
-              <a:t>the implemented QMS and determine its success</a:t>
-            </a:r>
+              <a:t>Loan or complicated banking service.</a:t>
+            </a:r>
+          </a:p>
+          <a:p>
             <a:r>
               <a:rPr lang="en-ZA" dirty="0" smtClean="0"/>
-              <a:t>.</a:t>
-            </a:r>
-          </a:p>
-          <a:p>
-            <a:pPr>
-              <a:spcBef>
-                <a:spcPts val="450"/>
-              </a:spcBef>
-              <a:buClr>
-                <a:srgbClr val="00308E"/>
-              </a:buClr>
-              <a:buFont typeface="Arial" panose="020B0604020202020204" pitchFamily="34" charset="0"/>
-              <a:buChar char="–"/>
-            </a:pPr>
-            <a:r>
-              <a:rPr lang="en-US" altLang="en-US" sz="2000" dirty="0">
-                <a:solidFill>
-                  <a:srgbClr val="00308E"/>
-                </a:solidFill>
-                <a:latin typeface="Arial" panose="020B0604020202020204" pitchFamily="34" charset="0"/>
-              </a:rPr>
-              <a:t>How do customers arrive in the restaurant? Are customer arrivals more during lunch, dinner time</a:t>
-            </a:r>
-            <a:br>
-              <a:rPr lang="en-US" altLang="en-US" sz="2000" dirty="0">
-                <a:solidFill>
-                  <a:srgbClr val="00308E"/>
-                </a:solidFill>
-                <a:latin typeface="Arial" panose="020B0604020202020204" pitchFamily="34" charset="0"/>
-              </a:rPr>
-            </a:br>
-            <a:r>
-              <a:rPr lang="en-US" altLang="en-US" sz="2000" dirty="0">
-                <a:solidFill>
-                  <a:srgbClr val="00308E"/>
-                </a:solidFill>
-                <a:latin typeface="Arial" panose="020B0604020202020204" pitchFamily="34" charset="0"/>
-              </a:rPr>
-              <a:t>(a regular restaurant)? Or is the customer traffic more uniformly distributed (a café)? </a:t>
-            </a:r>
-          </a:p>
-          <a:p>
-            <a:pPr>
-              <a:spcBef>
-                <a:spcPts val="450"/>
-              </a:spcBef>
-              <a:buClr>
-                <a:srgbClr val="00308E"/>
-              </a:buClr>
-              <a:buFont typeface="Arial" panose="020B0604020202020204" pitchFamily="34" charset="0"/>
-              <a:buChar char="–"/>
-            </a:pPr>
-            <a:r>
-              <a:rPr lang="en-US" altLang="en-US" sz="2000" dirty="0">
-                <a:solidFill>
-                  <a:srgbClr val="00308E"/>
-                </a:solidFill>
-                <a:latin typeface="Arial" panose="020B0604020202020204" pitchFamily="34" charset="0"/>
-              </a:rPr>
-              <a:t>How much time do customers spend in the restaurant? Do customers typically leave the restaurant</a:t>
-            </a:r>
-            <a:br>
-              <a:rPr lang="en-US" altLang="en-US" sz="2000" dirty="0">
-                <a:solidFill>
-                  <a:srgbClr val="00308E"/>
-                </a:solidFill>
-                <a:latin typeface="Arial" panose="020B0604020202020204" pitchFamily="34" charset="0"/>
-              </a:rPr>
-            </a:br>
-            <a:r>
-              <a:rPr lang="en-US" altLang="en-US" sz="2000" dirty="0">
-                <a:solidFill>
-                  <a:srgbClr val="00308E"/>
-                </a:solidFill>
-                <a:latin typeface="Arial" panose="020B0604020202020204" pitchFamily="34" charset="0"/>
-              </a:rPr>
-              <a:t>after a fixed amount of time? Does the customer service vary with the type of customer? </a:t>
-            </a:r>
-          </a:p>
-          <a:p>
-            <a:pPr>
-              <a:spcBef>
-                <a:spcPts val="450"/>
-              </a:spcBef>
-              <a:buClr>
-                <a:srgbClr val="00308E"/>
-              </a:buClr>
-              <a:buFont typeface="Arial" panose="020B0604020202020204" pitchFamily="34" charset="0"/>
-              <a:buChar char="–"/>
-            </a:pPr>
-            <a:r>
-              <a:rPr lang="en-US" altLang="en-US" sz="2000" dirty="0">
-                <a:solidFill>
-                  <a:srgbClr val="00308E"/>
-                </a:solidFill>
-                <a:latin typeface="Arial" panose="020B0604020202020204" pitchFamily="34" charset="0"/>
-              </a:rPr>
-              <a:t>How many tables does the restaurant have for serving customers?</a:t>
-            </a:r>
-            <a:endParaRPr lang="en-ZA" dirty="0" smtClean="0"/>
+              <a:t>The services take different times to complete a service.</a:t>
+            </a:r>
           </a:p>
           <a:p>
             <a:r>
               <a:rPr lang="en-ZA" dirty="0" smtClean="0"/>
-              <a:t>Classification:</a:t>
-            </a:r>
-          </a:p>
-          <a:p>
-            <a:pPr lvl="1"/>
+              <a:t>Customers arrive at different rates during the day.</a:t>
+            </a:r>
+          </a:p>
+          <a:p>
             <a:r>
               <a:rPr lang="en-ZA" dirty="0" smtClean="0"/>
-              <a:t>Arrival Process</a:t>
-            </a:r>
-          </a:p>
-          <a:p>
-            <a:pPr lvl="1"/>
+              <a:t>Customers do not leave the system once entering.</a:t>
+            </a:r>
+          </a:p>
+          <a:p>
             <a:r>
               <a:rPr lang="en-ZA" dirty="0" smtClean="0"/>
-              <a:t>Service Process</a:t>
-            </a:r>
-          </a:p>
-          <a:p>
-            <a:pPr lvl="1"/>
+              <a:t>Once a customer is serviced by a teller, </a:t>
+            </a:r>
             <a:r>
               <a:rPr lang="en-ZA" dirty="0" smtClean="0"/>
-              <a:t>Number of Servers</a:t>
-            </a:r>
-          </a:p>
-          <a:p>
-            <a:pPr lvl="1"/>
+              <a:t>the customer cannot be interrupted.</a:t>
+            </a:r>
+          </a:p>
+          <a:p>
             <a:r>
               <a:rPr lang="en-ZA" dirty="0" smtClean="0"/>
-              <a:t>A/S/n models</a:t>
-            </a:r>
+              <a:t>High quality customers need to be satisfied, which also yields baking profit.</a:t>
+            </a:r>
+          </a:p>
+          <a:p>
+            <a:r>
+              <a:rPr lang="en-ZA" dirty="0" smtClean="0"/>
+              <a:t>Service windows may provide different service rates due to the efficiency of the cashier.</a:t>
+            </a:r>
+          </a:p>
+          <a:p>
             <a:endParaRPr lang="en-ZA" dirty="0"/>
           </a:p>
         </p:txBody>
@@ -8172,65 +8311,123 @@
             <p:ph type="title"/>
           </p:nvPr>
         </p:nvSpPr>
-        <p:spPr/>
+        <p:spPr>
+          <a:xfrm>
+            <a:off x="2592925" y="624110"/>
+            <a:ext cx="8911687" cy="720058"/>
+          </a:xfrm>
+        </p:spPr>
         <p:txBody>
           <a:bodyPr/>
           <a:lstStyle/>
           <a:p>
             <a:r>
+              <a:rPr lang="en-ZA" dirty="0"/>
+              <a:t>System Requirements and classification</a:t>
+            </a:r>
+          </a:p>
+        </p:txBody>
+      </p:sp>
+      <p:sp>
+        <p:nvSpPr>
+          <p:cNvPr id="3" name="Content Placeholder 2"/>
+          <p:cNvSpPr>
+            <a:spLocks noGrp="1"/>
+          </p:cNvSpPr>
+          <p:nvPr>
+            <p:ph idx="1"/>
+          </p:nvPr>
+        </p:nvSpPr>
+        <p:spPr>
+          <a:xfrm>
+            <a:off x="2589212" y="1481328"/>
+            <a:ext cx="8915400" cy="4429894"/>
+          </a:xfrm>
+        </p:spPr>
+        <p:txBody>
+          <a:bodyPr>
+            <a:normAutofit fontScale="92500" lnSpcReduction="20000"/>
+          </a:bodyPr>
+          <a:lstStyle/>
+          <a:p>
+            <a:r>
               <a:rPr lang="en-ZA" dirty="0" smtClean="0"/>
-              <a:t>Queuing Management System Approach	</a:t>
+              <a:t>Arrival Process</a:t>
+            </a:r>
+          </a:p>
+          <a:p>
+            <a:pPr lvl="1"/>
+            <a:r>
+              <a:rPr lang="en-ZA" dirty="0" smtClean="0"/>
+              <a:t>The customers will arrive according to the time of day. At peak hours, the arrival rate will be high.</a:t>
+            </a:r>
+          </a:p>
+          <a:p>
+            <a:pPr lvl="1"/>
+            <a:r>
+              <a:rPr lang="en-ZA" dirty="0" smtClean="0"/>
+              <a:t>Customers types will be determined according to the probability distribution of customers requesting a specific service.</a:t>
+            </a:r>
+          </a:p>
+          <a:p>
+            <a:r>
+              <a:rPr lang="en-ZA" dirty="0" smtClean="0"/>
+              <a:t>Service Process</a:t>
+            </a:r>
+          </a:p>
+          <a:p>
+            <a:pPr lvl="1"/>
+            <a:r>
+              <a:rPr lang="en-ZA" dirty="0" smtClean="0"/>
+              <a:t>The service rate for each type of customer will vary according to the service they require.</a:t>
+            </a:r>
+          </a:p>
+          <a:p>
+            <a:pPr lvl="1"/>
+            <a:r>
+              <a:rPr lang="en-ZA" dirty="0" smtClean="0"/>
+              <a:t>The number of servers will vary according to the varying arrival rate during the day.</a:t>
+            </a:r>
+          </a:p>
+          <a:p>
+            <a:pPr lvl="1"/>
+            <a:r>
+              <a:rPr lang="en-ZA" dirty="0" smtClean="0"/>
+              <a:t>Customers will be serviced according to various service strategies such as FIFO, SJF and HPF.</a:t>
+            </a:r>
+          </a:p>
+          <a:p>
+            <a:pPr lvl="1"/>
+            <a:r>
+              <a:rPr lang="en-ZA" dirty="0" smtClean="0"/>
+              <a:t>Clients will be rejected only when the bank closes, but the servers will service all clients that have arrived before closing hours.</a:t>
             </a:r>
             <a:endParaRPr lang="en-ZA" dirty="0"/>
           </a:p>
-        </p:txBody>
-      </p:sp>
-      <p:sp>
-        <p:nvSpPr>
-          <p:cNvPr id="3" name="Content Placeholder 2"/>
-          <p:cNvSpPr>
-            <a:spLocks noGrp="1"/>
-          </p:cNvSpPr>
-          <p:nvPr>
-            <p:ph idx="1"/>
-          </p:nvPr>
-        </p:nvSpPr>
-        <p:spPr/>
-        <p:txBody>
-          <a:bodyPr/>
-          <a:lstStyle/>
           <a:p>
             <a:r>
               <a:rPr lang="en-ZA" dirty="0" smtClean="0"/>
-              <a:t>Design Factors</a:t>
+              <a:t>The system will take on an M/M/s queuing system when more than one service window is available.</a:t>
             </a:r>
           </a:p>
           <a:p>
             <a:r>
               <a:rPr lang="en-ZA" dirty="0" smtClean="0"/>
-              <a:t>Design Parameters</a:t>
-            </a:r>
-            <a:endParaRPr lang="en-ZA" dirty="0"/>
+              <a:t>The maximum number of service windows that will be available is five.</a:t>
+            </a:r>
           </a:p>
         </p:txBody>
       </p:sp>
     </p:spTree>
     <p:extLst>
       <p:ext uri="{BB962C8B-B14F-4D97-AF65-F5344CB8AC3E}">
-        <p14:creationId xmlns:p14="http://schemas.microsoft.com/office/powerpoint/2010/main" val="4205674831"/>
+        <p14:creationId xmlns:p14="http://schemas.microsoft.com/office/powerpoint/2010/main" val="2269143022"/>
       </p:ext>
     </p:extLst>
   </p:cSld>
   <p:clrMapOvr>
     <a:masterClrMapping/>
   </p:clrMapOvr>
-  <p:timing>
-    <p:tnLst>
-      <p:par>
-        <p:cTn id="1" dur="indefinite" restart="never" nodeType="tmRoot"/>
-      </p:par>
-    </p:tnLst>
-  </p:timing>
 </p:sld>
 </file>
 
@@ -8268,189 +8465,36 @@
           <a:p>
             <a:r>
               <a:rPr lang="en-ZA" dirty="0" smtClean="0"/>
+              <a:t>Queuing Management System Approach	</a:t>
+            </a:r>
+            <a:endParaRPr lang="en-ZA" dirty="0"/>
+          </a:p>
+        </p:txBody>
+      </p:sp>
+      <p:sp>
+        <p:nvSpPr>
+          <p:cNvPr id="3" name="Content Placeholder 2"/>
+          <p:cNvSpPr>
+            <a:spLocks noGrp="1"/>
+          </p:cNvSpPr>
+          <p:nvPr>
+            <p:ph idx="1"/>
+          </p:nvPr>
+        </p:nvSpPr>
+        <p:spPr/>
+        <p:txBody>
+          <a:bodyPr/>
+          <a:lstStyle/>
+          <a:p>
+            <a:r>
+              <a:rPr lang="en-ZA" dirty="0" smtClean="0"/>
               <a:t>Design Factors</a:t>
             </a:r>
-            <a:endParaRPr lang="en-ZA" dirty="0"/>
-          </a:p>
-        </p:txBody>
-      </p:sp>
-      <p:sp>
-        <p:nvSpPr>
-          <p:cNvPr id="3" name="Content Placeholder 2"/>
-          <p:cNvSpPr>
-            <a:spLocks noGrp="1"/>
-          </p:cNvSpPr>
-          <p:nvPr>
-            <p:ph idx="1"/>
-          </p:nvPr>
-        </p:nvSpPr>
-        <p:spPr/>
-        <p:txBody>
-          <a:bodyPr>
-            <a:normAutofit fontScale="47500" lnSpcReduction="20000"/>
-          </a:bodyPr>
-          <a:lstStyle/>
+          </a:p>
           <a:p>
             <a:r>
               <a:rPr lang="en-ZA" dirty="0" smtClean="0"/>
-              <a:t>Relate specifically </a:t>
-            </a:r>
-            <a:r>
-              <a:rPr lang="en-ZA" dirty="0"/>
-              <a:t>to the </a:t>
-            </a:r>
-            <a:r>
-              <a:rPr lang="en-ZA" dirty="0" smtClean="0"/>
-              <a:t>QMS </a:t>
-            </a:r>
-            <a:r>
-              <a:rPr lang="en-ZA" dirty="0"/>
-              <a:t>and are what dene the management structure</a:t>
-            </a:r>
-            <a:r>
-              <a:rPr lang="en-ZA" dirty="0" smtClean="0"/>
-              <a:t>.</a:t>
-            </a:r>
-          </a:p>
-          <a:p>
-            <a:r>
-              <a:rPr lang="en-ZA" dirty="0" smtClean="0"/>
-              <a:t>Arrival </a:t>
-            </a:r>
-            <a:r>
-              <a:rPr lang="en-ZA" dirty="0"/>
-              <a:t>process</a:t>
-            </a:r>
-          </a:p>
-          <a:p>
-            <a:pPr lvl="1"/>
-            <a:r>
-              <a:rPr lang="en-ZA" dirty="0"/>
-              <a:t> Inter-arrival time</a:t>
-            </a:r>
-          </a:p>
-          <a:p>
-            <a:pPr lvl="1"/>
-            <a:r>
-              <a:rPr lang="en-ZA" dirty="0"/>
-              <a:t> Group arrival</a:t>
-            </a:r>
-          </a:p>
-          <a:p>
-            <a:r>
-              <a:rPr lang="en-ZA" dirty="0" smtClean="0"/>
-              <a:t>Service </a:t>
-            </a:r>
-            <a:r>
-              <a:rPr lang="en-ZA" dirty="0"/>
-              <a:t>process</a:t>
-            </a:r>
-          </a:p>
-          <a:p>
-            <a:r>
-              <a:rPr lang="en-ZA" dirty="0" smtClean="0"/>
-              <a:t>Number </a:t>
-            </a:r>
-            <a:r>
-              <a:rPr lang="en-ZA" dirty="0"/>
-              <a:t>of servers</a:t>
-            </a:r>
-          </a:p>
-          <a:p>
-            <a:r>
-              <a:rPr lang="en-ZA" dirty="0" smtClean="0"/>
-              <a:t>Number </a:t>
-            </a:r>
-            <a:r>
-              <a:rPr lang="en-ZA" dirty="0"/>
-              <a:t>of queues</a:t>
-            </a:r>
-          </a:p>
-          <a:p>
-            <a:r>
-              <a:rPr lang="en-ZA" dirty="0" smtClean="0"/>
-              <a:t>Number </a:t>
-            </a:r>
-            <a:r>
-              <a:rPr lang="en-ZA" dirty="0"/>
-              <a:t>of waiting places (queuing areas)</a:t>
-            </a:r>
-          </a:p>
-          <a:p>
-            <a:r>
-              <a:rPr lang="en-ZA" dirty="0" smtClean="0"/>
-              <a:t>Service </a:t>
-            </a:r>
-            <a:r>
-              <a:rPr lang="en-ZA" dirty="0"/>
-              <a:t>disciplines</a:t>
-            </a:r>
-          </a:p>
-          <a:p>
-            <a:pPr lvl="1"/>
-            <a:r>
-              <a:rPr lang="en-ZA" dirty="0"/>
-              <a:t> FIFO</a:t>
-            </a:r>
-          </a:p>
-          <a:p>
-            <a:pPr lvl="1"/>
-            <a:r>
-              <a:rPr lang="en-ZA" dirty="0"/>
-              <a:t> LIFO</a:t>
-            </a:r>
-          </a:p>
-          <a:p>
-            <a:pPr lvl="1"/>
-            <a:r>
-              <a:rPr lang="en-ZA" dirty="0"/>
-              <a:t> Shortest job </a:t>
-            </a:r>
-            <a:r>
-              <a:rPr lang="en-ZA" dirty="0" err="1"/>
-              <a:t>rst</a:t>
-            </a:r>
-            <a:endParaRPr lang="en-ZA" dirty="0"/>
-          </a:p>
-          <a:p>
-            <a:pPr lvl="1"/>
-            <a:r>
-              <a:rPr lang="en-ZA" dirty="0"/>
-              <a:t> Most </a:t>
-            </a:r>
-            <a:r>
-              <a:rPr lang="en-ZA" dirty="0" err="1"/>
-              <a:t>protable</a:t>
-            </a:r>
-            <a:r>
-              <a:rPr lang="en-ZA" dirty="0"/>
-              <a:t> job </a:t>
-            </a:r>
-            <a:r>
-              <a:rPr lang="en-ZA" dirty="0" err="1"/>
-              <a:t>rst</a:t>
-            </a:r>
-            <a:endParaRPr lang="en-ZA" dirty="0"/>
-          </a:p>
-          <a:p>
-            <a:pPr lvl="1"/>
-            <a:r>
-              <a:rPr lang="en-ZA" dirty="0"/>
-              <a:t> Round Robin (RR)</a:t>
-            </a:r>
-          </a:p>
-          <a:p>
-            <a:pPr lvl="1"/>
-            <a:r>
-              <a:rPr lang="en-ZA" dirty="0"/>
-              <a:t> Processor Sharing</a:t>
-            </a:r>
-          </a:p>
-          <a:p>
-            <a:pPr lvl="1"/>
-            <a:r>
-              <a:rPr lang="en-ZA" dirty="0" smtClean="0"/>
-              <a:t> Priorities</a:t>
+              <a:t>Design Parameters</a:t>
             </a:r>
             <a:endParaRPr lang="en-ZA" dirty="0"/>
           </a:p>
@@ -8459,7 +8503,7 @@
     </p:spTree>
     <p:extLst>
       <p:ext uri="{BB962C8B-B14F-4D97-AF65-F5344CB8AC3E}">
-        <p14:creationId xmlns:p14="http://schemas.microsoft.com/office/powerpoint/2010/main" val="637754367"/>
+        <p14:creationId xmlns:p14="http://schemas.microsoft.com/office/powerpoint/2010/main" val="4205674831"/>
       </p:ext>
     </p:extLst>
   </p:cSld>
@@ -8509,9 +8553,10 @@
           <a:lstStyle/>
           <a:p>
             <a:r>
-              <a:rPr lang="en-ZA" dirty="0"/>
+              <a:rPr lang="en-ZA" dirty="0" smtClean="0"/>
               <a:t>Design Factors</a:t>
             </a:r>
+            <a:endParaRPr lang="en-ZA" dirty="0"/>
           </a:p>
         </p:txBody>
       </p:sp>
@@ -8525,82 +8570,26 @@
             <p:ph idx="1"/>
           </p:nvPr>
         </p:nvSpPr>
-        <p:spPr/>
-        <p:txBody>
-          <a:bodyPr/>
+        <p:spPr>
+          <a:xfrm>
+            <a:off x="2369756" y="1380744"/>
+            <a:ext cx="8915400" cy="4974336"/>
+          </a:xfrm>
+        </p:spPr>
+        <p:txBody>
+          <a:bodyPr>
+            <a:normAutofit/>
+          </a:bodyPr>
           <a:lstStyle/>
           <a:p>
-            <a:r>
-              <a:rPr lang="en-ZA" dirty="0" smtClean="0"/>
-              <a:t>Information </a:t>
-            </a:r>
-            <a:r>
-              <a:rPr lang="en-ZA" dirty="0"/>
-              <a:t>available</a:t>
-            </a:r>
-          </a:p>
-          <a:p>
-            <a:pPr lvl="1"/>
-            <a:r>
-              <a:rPr lang="en-ZA" dirty="0"/>
-              <a:t> Upon choice of queue does customer know length of queue and service time?</a:t>
-            </a:r>
-          </a:p>
-          <a:p>
-            <a:r>
-              <a:rPr lang="en-ZA" dirty="0" smtClean="0"/>
-              <a:t>Discrete </a:t>
-            </a:r>
-            <a:r>
-              <a:rPr lang="en-ZA" dirty="0"/>
-              <a:t>/ Continuous time</a:t>
-            </a:r>
-          </a:p>
-          <a:p>
-            <a:r>
-              <a:rPr lang="en-ZA" dirty="0" smtClean="0"/>
-              <a:t>Other </a:t>
-            </a:r>
-            <a:r>
-              <a:rPr lang="en-ZA" dirty="0"/>
-              <a:t>factors</a:t>
-            </a:r>
-          </a:p>
-          <a:p>
-            <a:pPr lvl="1"/>
-            <a:r>
-              <a:rPr lang="en-ZA" dirty="0"/>
-              <a:t> Faults / Malfunctions</a:t>
-            </a:r>
-          </a:p>
-          <a:p>
-            <a:pPr lvl="1"/>
-            <a:r>
-              <a:rPr lang="en-ZA" dirty="0"/>
-              <a:t> Strikes</a:t>
-            </a:r>
-          </a:p>
-          <a:p>
-            <a:pPr lvl="1"/>
-            <a:r>
-              <a:rPr lang="en-ZA" dirty="0"/>
-              <a:t> Real life events </a:t>
-            </a:r>
-            <a:r>
-              <a:rPr lang="en-ZA" dirty="0" err="1"/>
-              <a:t>aecting</a:t>
-            </a:r>
-            <a:r>
-              <a:rPr lang="en-ZA" dirty="0"/>
-              <a:t> the system</a:t>
-            </a:r>
+            <a:endParaRPr lang="en-ZA" dirty="0"/>
           </a:p>
         </p:txBody>
       </p:sp>
     </p:spTree>
     <p:extLst>
       <p:ext uri="{BB962C8B-B14F-4D97-AF65-F5344CB8AC3E}">
-        <p14:creationId xmlns:p14="http://schemas.microsoft.com/office/powerpoint/2010/main" val="1595905196"/>
+        <p14:creationId xmlns:p14="http://schemas.microsoft.com/office/powerpoint/2010/main" val="637754367"/>
       </p:ext>
     </p:extLst>
   </p:cSld>
@@ -8650,126 +8639,35 @@
           <a:lstStyle/>
           <a:p>
             <a:r>
-              <a:rPr lang="en-ZA" dirty="0" smtClean="0"/>
-              <a:t>Design Parameters</a:t>
-            </a:r>
+              <a:rPr lang="en-ZA" dirty="0"/>
+              <a:t>Design Factors</a:t>
+            </a:r>
+          </a:p>
+        </p:txBody>
+      </p:sp>
+      <p:sp>
+        <p:nvSpPr>
+          <p:cNvPr id="3" name="Content Placeholder 2"/>
+          <p:cNvSpPr>
+            <a:spLocks noGrp="1"/>
+          </p:cNvSpPr>
+          <p:nvPr>
+            <p:ph idx="1"/>
+          </p:nvPr>
+        </p:nvSpPr>
+        <p:spPr/>
+        <p:txBody>
+          <a:bodyPr/>
+          <a:lstStyle/>
+          <a:p>
             <a:endParaRPr lang="en-ZA" dirty="0"/>
-          </a:p>
-        </p:txBody>
-      </p:sp>
-      <p:sp>
-        <p:nvSpPr>
-          <p:cNvPr id="3" name="Content Placeholder 2"/>
-          <p:cNvSpPr>
-            <a:spLocks noGrp="1"/>
-          </p:cNvSpPr>
-          <p:nvPr>
-            <p:ph idx="1"/>
-          </p:nvPr>
-        </p:nvSpPr>
-        <p:spPr/>
-        <p:txBody>
-          <a:bodyPr>
-            <a:normAutofit fontScale="85000" lnSpcReduction="20000"/>
-          </a:bodyPr>
-          <a:lstStyle/>
-          <a:p>
-            <a:r>
-              <a:rPr lang="en-ZA" dirty="0"/>
-              <a:t>The parameters used in the analysis of the system queues are as follows:</a:t>
-            </a:r>
-          </a:p>
-          <a:p>
-            <a:pPr lvl="1"/>
-            <a:r>
-              <a:rPr lang="en-ZA" dirty="0"/>
-              <a:t> Service Discipline</a:t>
-            </a:r>
-          </a:p>
-          <a:p>
-            <a:pPr lvl="1"/>
-            <a:r>
-              <a:rPr lang="en-ZA" dirty="0"/>
-              <a:t> Number of servers</a:t>
-            </a:r>
-          </a:p>
-          <a:p>
-            <a:pPr lvl="1"/>
-            <a:r>
-              <a:rPr lang="en-ZA" dirty="0"/>
-              <a:t> Peak time (days/months/year)</a:t>
-            </a:r>
-          </a:p>
-          <a:p>
-            <a:pPr lvl="1"/>
-            <a:r>
-              <a:rPr lang="en-ZA" dirty="0"/>
-              <a:t> Queuing area</a:t>
-            </a:r>
-          </a:p>
-          <a:p>
-            <a:pPr lvl="1"/>
-            <a:r>
-              <a:rPr lang="en-ZA" dirty="0"/>
-              <a:t> Average service time</a:t>
-            </a:r>
-          </a:p>
-          <a:p>
-            <a:pPr lvl="1"/>
-            <a:r>
-              <a:rPr lang="en-ZA" dirty="0"/>
-              <a:t> Average waiting time</a:t>
-            </a:r>
-          </a:p>
-          <a:p>
-            <a:pPr lvl="1"/>
-            <a:r>
-              <a:rPr lang="en-ZA" dirty="0"/>
-              <a:t> Average time between arrivals</a:t>
-            </a:r>
-          </a:p>
-          <a:p>
-            <a:pPr lvl="1"/>
-            <a:r>
-              <a:rPr lang="en-ZA" dirty="0"/>
-              <a:t> Arrival rate</a:t>
-            </a:r>
-          </a:p>
-          <a:p>
-            <a:pPr lvl="1"/>
-            <a:r>
-              <a:rPr lang="en-ZA" dirty="0"/>
-              <a:t> Service rate</a:t>
-            </a:r>
-          </a:p>
-          <a:p>
-            <a:pPr lvl="1"/>
-            <a:r>
-              <a:rPr lang="en-ZA" dirty="0"/>
-              <a:t> Mean time for customers to wait and be served</a:t>
-            </a:r>
-          </a:p>
-          <a:p>
-            <a:pPr lvl="1"/>
-            <a:r>
-              <a:rPr lang="en-ZA" dirty="0"/>
-              <a:t> </a:t>
-            </a:r>
-            <a:r>
-              <a:rPr lang="en-ZA" dirty="0" smtClean="0"/>
-              <a:t>Efficiency </a:t>
-            </a:r>
-            <a:r>
-              <a:rPr lang="en-ZA" dirty="0"/>
-              <a:t>(performance factor)</a:t>
-            </a:r>
           </a:p>
         </p:txBody>
       </p:sp>
     </p:spTree>
     <p:extLst>
       <p:ext uri="{BB962C8B-B14F-4D97-AF65-F5344CB8AC3E}">
-        <p14:creationId xmlns:p14="http://schemas.microsoft.com/office/powerpoint/2010/main" val="1774076650"/>
+        <p14:creationId xmlns:p14="http://schemas.microsoft.com/office/powerpoint/2010/main" val="1595905196"/>
       </p:ext>
     </p:extLst>
   </p:cSld>
@@ -8820,7 +8718,7 @@
           <a:p>
             <a:r>
               <a:rPr lang="en-ZA" dirty="0" smtClean="0"/>
-              <a:t>Quality of Service</a:t>
+              <a:t>Design Parameters</a:t>
             </a:r>
             <a:endParaRPr lang="en-ZA" dirty="0"/>
           </a:p>
@@ -8836,74 +8734,340 @@
             <p:ph idx="1"/>
           </p:nvPr>
         </p:nvSpPr>
-        <p:spPr/>
-        <p:txBody>
-          <a:bodyPr/>
+        <p:spPr>
+          <a:xfrm>
+            <a:off x="2589212" y="1426464"/>
+            <a:ext cx="8915400" cy="4484758"/>
+          </a:xfrm>
+        </p:spPr>
+        <p:txBody>
+          <a:bodyPr>
+            <a:normAutofit fontScale="85000" lnSpcReduction="20000"/>
+          </a:bodyPr>
           <a:lstStyle/>
           <a:p>
             <a:r>
               <a:rPr lang="en-ZA" dirty="0" smtClean="0"/>
-              <a:t>Measure </a:t>
+              <a:t>Service disciplines to be considered</a:t>
+            </a:r>
+          </a:p>
+          <a:p>
+            <a:pPr lvl="1"/>
+            <a:r>
+              <a:rPr lang="en-ZA" dirty="0" smtClean="0"/>
+              <a:t>First-in, first-out (FIFO)</a:t>
+            </a:r>
+          </a:p>
+          <a:p>
+            <a:pPr lvl="1"/>
+            <a:r>
+              <a:rPr lang="en-ZA" dirty="0" smtClean="0"/>
+              <a:t>Shortest-process-first (SPF)</a:t>
+            </a:r>
+          </a:p>
+          <a:p>
+            <a:pPr lvl="1"/>
+            <a:r>
+              <a:rPr lang="en-ZA" dirty="0" smtClean="0"/>
+              <a:t>Highest-priority-first (HPF)</a:t>
+            </a:r>
+            <a:br>
+              <a:rPr lang="en-ZA" dirty="0" smtClean="0"/>
+            </a:br>
+            <a:endParaRPr lang="en-ZA" dirty="0" smtClean="0"/>
+          </a:p>
+          <a:p>
+            <a:r>
+              <a:rPr lang="en-ZA" dirty="0" smtClean="0"/>
+              <a:t>Peak times and off peak times</a:t>
+            </a:r>
+          </a:p>
+          <a:p>
+            <a:endParaRPr lang="en-ZA" dirty="0"/>
+          </a:p>
+          <a:p>
+            <a:endParaRPr lang="en-ZA" dirty="0" smtClean="0"/>
+          </a:p>
+          <a:p>
+            <a:endParaRPr lang="en-ZA" dirty="0"/>
+          </a:p>
+          <a:p>
+            <a:endParaRPr lang="en-ZA" dirty="0" smtClean="0"/>
+          </a:p>
+          <a:p>
+            <a:endParaRPr lang="en-ZA" dirty="0" smtClean="0"/>
+          </a:p>
+          <a:p>
+            <a:endParaRPr lang="en-ZA" dirty="0" smtClean="0"/>
+          </a:p>
+          <a:p>
+            <a:r>
+              <a:rPr lang="en-ZA" dirty="0" smtClean="0"/>
+              <a:t>Number </a:t>
             </a:r>
             <a:r>
               <a:rPr lang="en-ZA" dirty="0"/>
-              <a:t>and evaluate performance</a:t>
-            </a:r>
-            <a:r>
-              <a:rPr lang="en-ZA" dirty="0" smtClean="0"/>
-              <a:t>.</a:t>
-            </a:r>
-          </a:p>
-          <a:p>
-            <a:r>
-              <a:rPr lang="en-ZA" dirty="0" smtClean="0"/>
-              <a:t>Also </a:t>
-            </a:r>
+              <a:t>of servers</a:t>
+            </a:r>
+          </a:p>
+          <a:p>
+            <a:pPr lvl="1"/>
             <a:r>
               <a:rPr lang="en-ZA" dirty="0"/>
-              <a:t>implements mechanisms that allow </a:t>
-            </a:r>
-            <a:r>
-              <a:rPr lang="en-ZA" dirty="0" smtClean="0"/>
-              <a:t>for control </a:t>
-            </a:r>
+              <a:t>5 in peak times</a:t>
+            </a:r>
+          </a:p>
+          <a:p>
+            <a:pPr lvl="1"/>
             <a:r>
               <a:rPr lang="en-ZA" dirty="0"/>
-              <a:t>of certain parameters in the system, such as throughput or prioritising.</a:t>
-            </a:r>
+              <a:t>3 in off-peak times</a:t>
+            </a:r>
+          </a:p>
+          <a:p>
+            <a:endParaRPr lang="en-ZA" dirty="0"/>
+          </a:p>
+          <a:p>
             <a:endParaRPr lang="en-ZA" dirty="0" smtClean="0"/>
           </a:p>
           <a:p>
-            <a:r>
-              <a:rPr lang="en-ZA" dirty="0" smtClean="0"/>
-              <a:t>Error rates</a:t>
-            </a:r>
-          </a:p>
-          <a:p>
-            <a:r>
-              <a:rPr lang="en-ZA" dirty="0" smtClean="0"/>
-              <a:t>Throughput</a:t>
-            </a:r>
-          </a:p>
-          <a:p>
-            <a:r>
-              <a:rPr lang="en-ZA" dirty="0" smtClean="0"/>
-              <a:t>Transmission delay</a:t>
-            </a:r>
-          </a:p>
-          <a:p>
-            <a:r>
-              <a:rPr lang="en-ZA" dirty="0" smtClean="0"/>
-              <a:t>Availability</a:t>
-            </a:r>
             <a:endParaRPr lang="en-ZA" dirty="0"/>
           </a:p>
         </p:txBody>
       </p:sp>
+      <p:graphicFrame>
+        <p:nvGraphicFramePr>
+          <p:cNvPr id="4" name="Table 3"/>
+          <p:cNvGraphicFramePr>
+            <a:graphicFrameLocks noGrp="1"/>
+          </p:cNvGraphicFramePr>
+          <p:nvPr>
+            <p:extLst>
+              <p:ext uri="{D42A27DB-BD31-4B8C-83A1-F6EECF244321}">
+                <p14:modId xmlns:p14="http://schemas.microsoft.com/office/powerpoint/2010/main" val="3538536114"/>
+              </p:ext>
+            </p:extLst>
+          </p:nvPr>
+        </p:nvGraphicFramePr>
+        <p:xfrm>
+          <a:off x="3056128" y="3115631"/>
+          <a:ext cx="5418666" cy="1584960"/>
+        </p:xfrm>
+        <a:graphic>
+          <a:graphicData uri="http://schemas.openxmlformats.org/drawingml/2006/table">
+            <a:tbl>
+              <a:tblPr firstRow="1" bandRow="1">
+                <a:tableStyleId>{5C22544A-7EE6-4342-B048-85BDC9FD1C3A}</a:tableStyleId>
+              </a:tblPr>
+              <a:tblGrid>
+                <a:gridCol w="2709333">
+                  <a:extLst>
+                    <a:ext uri="{9D8B030D-6E8A-4147-A177-3AD203B41FA5}">
+                      <a16:colId xmlns:a16="http://schemas.microsoft.com/office/drawing/2014/main" val="1388929520"/>
+                    </a:ext>
+                  </a:extLst>
+                </a:gridCol>
+                <a:gridCol w="2709333">
+                  <a:extLst>
+                    <a:ext uri="{9D8B030D-6E8A-4147-A177-3AD203B41FA5}">
+                      <a16:colId xmlns:a16="http://schemas.microsoft.com/office/drawing/2014/main" val="1861407739"/>
+                    </a:ext>
+                  </a:extLst>
+                </a:gridCol>
+              </a:tblGrid>
+              <a:tr h="356616">
+                <a:tc>
+                  <a:txBody>
+                    <a:bodyPr/>
+                    <a:lstStyle/>
+                    <a:p>
+                      <a:pPr algn="ctr"/>
+                      <a:r>
+                        <a:rPr lang="en-ZA" dirty="0" smtClean="0"/>
+                        <a:t>Time of the day</a:t>
+                      </a:r>
+                      <a:endParaRPr lang="en-ZA" dirty="0"/>
+                    </a:p>
+                  </a:txBody>
+                  <a:tcPr/>
+                </a:tc>
+                <a:tc>
+                  <a:txBody>
+                    <a:bodyPr/>
+                    <a:lstStyle/>
+                    <a:p>
+                      <a:pPr algn="ctr"/>
+                      <a:r>
+                        <a:rPr lang="en-ZA" dirty="0" smtClean="0"/>
+                        <a:t>Peak/Off-peak</a:t>
+                      </a:r>
+                      <a:endParaRPr lang="en-ZA" dirty="0"/>
+                    </a:p>
+                  </a:txBody>
+                  <a:tcPr/>
+                </a:tc>
+                <a:extLst>
+                  <a:ext uri="{0D108BD9-81ED-4DB2-BD59-A6C34878D82A}">
+                    <a16:rowId xmlns:a16="http://schemas.microsoft.com/office/drawing/2014/main" val="1962668319"/>
+                  </a:ext>
+                </a:extLst>
+              </a:tr>
+              <a:tr h="285835">
+                <a:tc>
+                  <a:txBody>
+                    <a:bodyPr/>
+                    <a:lstStyle/>
+                    <a:p>
+                      <a:pPr algn="ctr"/>
+                      <a:r>
+                        <a:rPr lang="en-ZA" sz="1400" dirty="0" smtClean="0"/>
+                        <a:t>08:30 – 10:00</a:t>
+                      </a:r>
+                      <a:endParaRPr lang="en-ZA" sz="1400" dirty="0"/>
+                    </a:p>
+                  </a:txBody>
+                  <a:tcPr/>
+                </a:tc>
+                <a:tc>
+                  <a:txBody>
+                    <a:bodyPr/>
+                    <a:lstStyle/>
+                    <a:p>
+                      <a:pPr algn="ctr"/>
+                      <a:r>
+                        <a:rPr lang="en-ZA" sz="1400" dirty="0" smtClean="0"/>
+                        <a:t>Peak</a:t>
+                      </a:r>
+                      <a:endParaRPr lang="en-ZA" sz="1400" dirty="0"/>
+                    </a:p>
+                  </a:txBody>
+                  <a:tcPr/>
+                </a:tc>
+                <a:extLst>
+                  <a:ext uri="{0D108BD9-81ED-4DB2-BD59-A6C34878D82A}">
+                    <a16:rowId xmlns:a16="http://schemas.microsoft.com/office/drawing/2014/main" val="2073084233"/>
+                  </a:ext>
+                </a:extLst>
+              </a:tr>
+              <a:tr h="285835">
+                <a:tc>
+                  <a:txBody>
+                    <a:bodyPr/>
+                    <a:lstStyle/>
+                    <a:p>
+                      <a:pPr algn="ctr"/>
+                      <a:r>
+                        <a:rPr lang="en-ZA" sz="1400" dirty="0" smtClean="0"/>
+                        <a:t>10:00 – 11:00</a:t>
+                      </a:r>
+                      <a:endParaRPr lang="en-ZA" sz="1400" dirty="0"/>
+                    </a:p>
+                  </a:txBody>
+                  <a:tcPr/>
+                </a:tc>
+                <a:tc>
+                  <a:txBody>
+                    <a:bodyPr/>
+                    <a:lstStyle/>
+                    <a:p>
+                      <a:pPr algn="ctr"/>
+                      <a:r>
+                        <a:rPr lang="en-ZA" sz="1400" dirty="0" smtClean="0"/>
+                        <a:t>Off-peak</a:t>
+                      </a:r>
+                      <a:endParaRPr lang="en-ZA" sz="1400" dirty="0"/>
+                    </a:p>
+                  </a:txBody>
+                  <a:tcPr/>
+                </a:tc>
+                <a:extLst>
+                  <a:ext uri="{0D108BD9-81ED-4DB2-BD59-A6C34878D82A}">
+                    <a16:rowId xmlns:a16="http://schemas.microsoft.com/office/drawing/2014/main" val="3701838074"/>
+                  </a:ext>
+                </a:extLst>
+              </a:tr>
+              <a:tr h="285835">
+                <a:tc>
+                  <a:txBody>
+                    <a:bodyPr/>
+                    <a:lstStyle/>
+                    <a:p>
+                      <a:pPr algn="ctr"/>
+                      <a:r>
+                        <a:rPr lang="en-ZA" sz="1400" dirty="0" smtClean="0"/>
+                        <a:t>11:00 – 13:30</a:t>
+                      </a:r>
+                      <a:endParaRPr lang="en-ZA" sz="1400" dirty="0"/>
+                    </a:p>
+                  </a:txBody>
+                  <a:tcPr/>
+                </a:tc>
+                <a:tc>
+                  <a:txBody>
+                    <a:bodyPr/>
+                    <a:lstStyle/>
+                    <a:p>
+                      <a:pPr algn="ctr"/>
+                      <a:r>
+                        <a:rPr lang="en-ZA" sz="1400" dirty="0" smtClean="0"/>
+                        <a:t>Peak</a:t>
+                      </a:r>
+                      <a:endParaRPr lang="en-ZA" sz="1400" dirty="0"/>
+                    </a:p>
+                  </a:txBody>
+                  <a:tcPr/>
+                </a:tc>
+                <a:extLst>
+                  <a:ext uri="{0D108BD9-81ED-4DB2-BD59-A6C34878D82A}">
+                    <a16:rowId xmlns:a16="http://schemas.microsoft.com/office/drawing/2014/main" val="2321624831"/>
+                  </a:ext>
+                </a:extLst>
+              </a:tr>
+              <a:tr h="285835">
+                <a:tc>
+                  <a:txBody>
+                    <a:bodyPr/>
+                    <a:lstStyle/>
+                    <a:p>
+                      <a:pPr algn="ctr"/>
+                      <a:r>
+                        <a:rPr lang="en-ZA" sz="1400" dirty="0" smtClean="0"/>
+                        <a:t>13:30 – 16:30</a:t>
+                      </a:r>
+                      <a:endParaRPr lang="en-ZA" sz="1400" dirty="0"/>
+                    </a:p>
+                  </a:txBody>
+                  <a:tcPr/>
+                </a:tc>
+                <a:tc>
+                  <a:txBody>
+                    <a:bodyPr/>
+                    <a:lstStyle/>
+                    <a:p>
+                      <a:pPr algn="ctr"/>
+                      <a:r>
+                        <a:rPr lang="en-ZA" sz="1400" dirty="0" smtClean="0"/>
+                        <a:t>Off-peak</a:t>
+                      </a:r>
+                      <a:endParaRPr lang="en-ZA" sz="1400" dirty="0"/>
+                    </a:p>
+                  </a:txBody>
+                  <a:tcPr/>
+                </a:tc>
+                <a:extLst>
+                  <a:ext uri="{0D108BD9-81ED-4DB2-BD59-A6C34878D82A}">
+                    <a16:rowId xmlns:a16="http://schemas.microsoft.com/office/drawing/2014/main" val="1143963682"/>
+                  </a:ext>
+                </a:extLst>
+              </a:tr>
+            </a:tbl>
+          </a:graphicData>
+        </a:graphic>
+      </p:graphicFrame>
     </p:spTree>
     <p:extLst>
       <p:ext uri="{BB962C8B-B14F-4D97-AF65-F5344CB8AC3E}">
-        <p14:creationId xmlns:p14="http://schemas.microsoft.com/office/powerpoint/2010/main" val="4154402910"/>
+        <p14:creationId xmlns:p14="http://schemas.microsoft.com/office/powerpoint/2010/main" val="1774076650"/>
       </p:ext>
     </p:extLst>
   </p:cSld>
@@ -8947,55 +9111,65 @@
             <p:ph type="title"/>
           </p:nvPr>
         </p:nvSpPr>
-        <p:spPr/>
+        <p:spPr>
+          <a:xfrm>
+            <a:off x="2592925" y="624110"/>
+            <a:ext cx="8911687" cy="628618"/>
+          </a:xfrm>
+        </p:spPr>
+        <p:txBody>
+          <a:bodyPr>
+            <a:normAutofit fontScale="90000"/>
+          </a:bodyPr>
+          <a:lstStyle/>
+          <a:p>
+            <a:r>
+              <a:rPr lang="en-ZA" dirty="0"/>
+              <a:t>Design Parameters</a:t>
+            </a:r>
+          </a:p>
+        </p:txBody>
+      </p:sp>
+      <p:sp>
+        <p:nvSpPr>
+          <p:cNvPr id="3" name="Content Placeholder 2"/>
+          <p:cNvSpPr>
+            <a:spLocks noGrp="1"/>
+          </p:cNvSpPr>
+          <p:nvPr>
+            <p:ph idx="1"/>
+          </p:nvPr>
+        </p:nvSpPr>
+        <p:spPr>
+          <a:xfrm>
+            <a:off x="2589212" y="1252728"/>
+            <a:ext cx="8915400" cy="4658494"/>
+          </a:xfrm>
+        </p:spPr>
         <p:txBody>
           <a:bodyPr/>
           <a:lstStyle/>
           <a:p>
             <a:r>
               <a:rPr lang="en-ZA" dirty="0" smtClean="0"/>
-              <a:t>FPGA implementation</a:t>
-            </a:r>
+              <a:t>It is assumed that there is an infinite amount of waiting space in the system and that no client will be rejected between working hours. </a:t>
+            </a:r>
+          </a:p>
+          <a:p>
             <a:endParaRPr lang="en-ZA" dirty="0"/>
-          </a:p>
-        </p:txBody>
-      </p:sp>
-      <p:sp>
-        <p:nvSpPr>
-          <p:cNvPr id="3" name="Content Placeholder 2"/>
-          <p:cNvSpPr>
-            <a:spLocks noGrp="1"/>
-          </p:cNvSpPr>
-          <p:nvPr>
-            <p:ph idx="1"/>
-          </p:nvPr>
-        </p:nvSpPr>
-        <p:spPr/>
-        <p:txBody>
-          <a:bodyPr/>
-          <a:lstStyle/>
-          <a:p>
-            <a:endParaRPr lang="en-ZA"/>
           </a:p>
         </p:txBody>
       </p:sp>
     </p:spTree>
     <p:extLst>
       <p:ext uri="{BB962C8B-B14F-4D97-AF65-F5344CB8AC3E}">
-        <p14:creationId xmlns:p14="http://schemas.microsoft.com/office/powerpoint/2010/main" val="3843322359"/>
+        <p14:creationId xmlns:p14="http://schemas.microsoft.com/office/powerpoint/2010/main" val="525785799"/>
       </p:ext>
     </p:extLst>
   </p:cSld>
   <p:clrMapOvr>
     <a:masterClrMapping/>
   </p:clrMapOvr>
-  <p:timing>
-    <p:tnLst>
-      <p:par>
-        <p:cTn id="1" dur="indefinite" restart="never" nodeType="tmRoot"/>
-      </p:par>
-    </p:tnLst>
-  </p:timing>
 </p:sld>
 </file>
 

</xml_diff>